<commit_message>
README: update readme and documentation
</commit_message>
<xml_diff>
--- a/documentions/Power Point Muhammad Khairunnas.pptx
+++ b/documentions/Power Point Muhammad Khairunnas.pptx
@@ -307,7 +307,7 @@
       </p15:sldGuideLst>
     </p:ext>
     <p:ext uri="GoogleSlidesCustomDataVersion2">
-      <go:slidesCustomData xmlns:go="http://customooxmlschemas.google.com/" r:id="rId49" roundtripDataSignature="AMtx7mjdE3ecmbSaYMQQDqxHWITwp5ua3w=="/>
+      <go:slidesCustomData xmlns:go="http://customooxmlschemas.google.com/" r:id="rId49" roundtripDataSignature="AMtx7mjqu2B55sDqx7WUaKT2w5szFnVmKg=="/>
     </p:ext>
   </p:extLst>
 </p:presentation>
@@ -33308,7 +33308,7 @@
         <p:spPr>
           <a:xfrm>
             <a:off x="152400" y="788511"/>
-            <a:ext cx="8840777" cy="3028183"/>
+            <a:ext cx="8840776" cy="3069561"/>
           </a:xfrm>
           <a:prstGeom prst="rect">
             <a:avLst/>

</xml_diff>